<commit_message>
updated powerpoint with content
</commit_message>
<xml_diff>
--- a/projectIntro.pptx
+++ b/projectIntro.pptx
@@ -6,6 +6,9 @@
   </p:sldMasterIdLst>
   <p:sldIdLst>
     <p:sldId id="256" r:id="rId2"/>
+    <p:sldId id="257" r:id="rId3"/>
+    <p:sldId id="258" r:id="rId4"/>
+    <p:sldId id="259" r:id="rId5"/>
   </p:sldIdLst>
   <p:sldSz cx="12192000" cy="6858000"/>
   <p:notesSz cx="6858000" cy="9144000"/>
@@ -3337,37 +3340,124 @@
             <p:ph type="ctrTitle"/>
           </p:nvPr>
         </p:nvSpPr>
-        <p:spPr/>
-        <p:txBody>
-          <a:bodyPr/>
-          <a:lstStyle/>
-          <a:p>
-            <a:endParaRPr lang="en-US"/>
-          </a:p>
-        </p:txBody>
-      </p:sp>
-      <p:sp>
-        <p:nvSpPr>
-          <p:cNvPr id="3" name="Subtitle 2">
-            <a:extLst>
-              <a:ext uri="{FF2B5EF4-FFF2-40B4-BE49-F238E27FC236}">
-                <a16:creationId xmlns:a16="http://schemas.microsoft.com/office/drawing/2014/main" id="{1AA1342F-D2B6-FCA7-7244-CCECFC63D6B7}"/>
-              </a:ext>
-            </a:extLst>
-          </p:cNvPr>
-          <p:cNvSpPr>
-            <a:spLocks noGrp="1"/>
-          </p:cNvSpPr>
-          <p:nvPr>
-            <p:ph type="subTitle" idx="1"/>
-          </p:nvPr>
-        </p:nvSpPr>
-        <p:spPr/>
-        <p:txBody>
-          <a:bodyPr/>
-          <a:lstStyle/>
-          <a:p>
-            <a:endParaRPr lang="en-US"/>
+        <p:spPr>
+          <a:xfrm>
+            <a:off x="1524000" y="575825"/>
+            <a:ext cx="9144000" cy="1021747"/>
+          </a:xfrm>
+        </p:spPr>
+        <p:txBody>
+          <a:bodyPr/>
+          <a:lstStyle/>
+          <a:p>
+            <a:r>
+              <a:rPr lang="en-US" dirty="0" err="1"/>
+              <a:t>PianoMen</a:t>
+            </a:r>
+            <a:r>
+              <a:rPr lang="en-US" dirty="0"/>
+              <a:t> </a:t>
+            </a:r>
+          </a:p>
+        </p:txBody>
+      </p:sp>
+      <p:sp>
+        <p:nvSpPr>
+          <p:cNvPr id="5" name="TextBox 4">
+            <a:extLst>
+              <a:ext uri="{FF2B5EF4-FFF2-40B4-BE49-F238E27FC236}">
+                <a16:creationId xmlns:a16="http://schemas.microsoft.com/office/drawing/2014/main" id="{F2093715-C3EC-9E53-E9DF-073CA2CC375D}"/>
+              </a:ext>
+            </a:extLst>
+          </p:cNvPr>
+          <p:cNvSpPr txBox="1"/>
+          <p:nvPr/>
+        </p:nvSpPr>
+        <p:spPr>
+          <a:xfrm>
+            <a:off x="515007" y="2070538"/>
+            <a:ext cx="10896701" cy="2308324"/>
+          </a:xfrm>
+          <a:prstGeom prst="rect">
+            <a:avLst/>
+          </a:prstGeom>
+          <a:noFill/>
+        </p:spPr>
+        <p:txBody>
+          <a:bodyPr wrap="none" rtlCol="0">
+            <a:spAutoFit/>
+          </a:bodyPr>
+          <a:lstStyle/>
+          <a:p>
+            <a:pPr marL="285750" indent="-285750">
+              <a:buFont typeface="Arial" panose="020B0604020202020204" pitchFamily="34" charset="0"/>
+              <a:buChar char="•"/>
+            </a:pPr>
+            <a:r>
+              <a:rPr lang="en-US" dirty="0"/>
+              <a:t>Interactive website, which will display a piano to the user</a:t>
+            </a:r>
+          </a:p>
+          <a:p>
+            <a:pPr marL="285750" indent="-285750">
+              <a:buFont typeface="Arial" panose="020B0604020202020204" pitchFamily="34" charset="0"/>
+              <a:buChar char="•"/>
+            </a:pPr>
+            <a:r>
+              <a:rPr lang="en-US" dirty="0"/>
+              <a:t>The user will be able to click on the piano keys to produce note sounds, with the keys changing color to</a:t>
+            </a:r>
+            <a:br>
+              <a:rPr lang="en-US" dirty="0"/>
+            </a:br>
+            <a:r>
+              <a:rPr lang="en-US" dirty="0"/>
+              <a:t>show they were pressed </a:t>
+            </a:r>
+          </a:p>
+          <a:p>
+            <a:pPr marL="285750" indent="-285750">
+              <a:buFont typeface="Arial" panose="020B0604020202020204" pitchFamily="34" charset="0"/>
+              <a:buChar char="•"/>
+            </a:pPr>
+            <a:r>
+              <a:rPr lang="en-US" dirty="0"/>
+              <a:t>The user will have a box that will show which key (note) they pressed </a:t>
+            </a:r>
+          </a:p>
+          <a:p>
+            <a:pPr marL="285750" indent="-285750">
+              <a:buFont typeface="Arial" panose="020B0604020202020204" pitchFamily="34" charset="0"/>
+              <a:buChar char="•"/>
+            </a:pPr>
+            <a:r>
+              <a:rPr lang="en-US" dirty="0"/>
+              <a:t>The pressed notes will get recorded and the user will be able to store the “song” and later re-play</a:t>
+            </a:r>
+            <a:br>
+              <a:rPr lang="en-US" dirty="0"/>
+            </a:br>
+            <a:r>
+              <a:rPr lang="en-US" dirty="0"/>
+              <a:t>that song</a:t>
+            </a:r>
+          </a:p>
+          <a:p>
+            <a:pPr marL="285750" indent="-285750">
+              <a:buFont typeface="Arial" panose="020B0604020202020204" pitchFamily="34" charset="0"/>
+              <a:buChar char="•"/>
+            </a:pPr>
+            <a:r>
+              <a:rPr lang="en-US" dirty="0"/>
+              <a:t>The user will have the option to select from several piano / website style themes to match their preference</a:t>
+            </a:r>
+          </a:p>
+          <a:p>
+            <a:pPr marL="285750" indent="-285750">
+              <a:buFont typeface="Arial" panose="020B0604020202020204" pitchFamily="34" charset="0"/>
+              <a:buChar char="•"/>
+            </a:pPr>
+            <a:endParaRPr lang="en-US" dirty="0"/>
           </a:p>
         </p:txBody>
       </p:sp>
@@ -3375,6 +3465,765 @@
     <p:extLst>
       <p:ext uri="{BB962C8B-B14F-4D97-AF65-F5344CB8AC3E}">
         <p14:creationId xmlns:p14="http://schemas.microsoft.com/office/powerpoint/2010/main" val="305873359"/>
+      </p:ext>
+    </p:extLst>
+  </p:cSld>
+  <p:clrMapOvr>
+    <a:masterClrMapping/>
+  </p:clrMapOvr>
+</p:sld>
+</file>
+
+<file path=ppt/slides/slide2.xml><?xml version="1.0" encoding="utf-8"?>
+<p:sld xmlns:a="http://schemas.openxmlformats.org/drawingml/2006/main" xmlns:r="http://schemas.openxmlformats.org/officeDocument/2006/relationships" xmlns:p="http://schemas.openxmlformats.org/presentationml/2006/main">
+  <p:cSld>
+    <p:spTree>
+      <p:nvGrpSpPr>
+        <p:cNvPr id="1" name=""/>
+        <p:cNvGrpSpPr/>
+        <p:nvPr/>
+      </p:nvGrpSpPr>
+      <p:grpSpPr>
+        <a:xfrm>
+          <a:off x="0" y="0"/>
+          <a:ext cx="0" cy="0"/>
+          <a:chOff x="0" y="0"/>
+          <a:chExt cx="0" cy="0"/>
+        </a:xfrm>
+      </p:grpSpPr>
+      <p:sp>
+        <p:nvSpPr>
+          <p:cNvPr id="2" name="Title 1">
+            <a:extLst>
+              <a:ext uri="{FF2B5EF4-FFF2-40B4-BE49-F238E27FC236}">
+                <a16:creationId xmlns:a16="http://schemas.microsoft.com/office/drawing/2014/main" id="{5EAE3704-F97F-E255-B239-7BBC06307F70}"/>
+              </a:ext>
+            </a:extLst>
+          </p:cNvPr>
+          <p:cNvSpPr>
+            <a:spLocks noGrp="1"/>
+          </p:cNvSpPr>
+          <p:nvPr>
+            <p:ph type="title"/>
+          </p:nvPr>
+        </p:nvSpPr>
+        <p:spPr/>
+        <p:txBody>
+          <a:bodyPr/>
+          <a:lstStyle/>
+          <a:p>
+            <a:r>
+              <a:rPr lang="en-US" dirty="0"/>
+              <a:t>User Story</a:t>
+            </a:r>
+          </a:p>
+        </p:txBody>
+      </p:sp>
+      <p:sp>
+        <p:nvSpPr>
+          <p:cNvPr id="3" name="Content Placeholder 2">
+            <a:extLst>
+              <a:ext uri="{FF2B5EF4-FFF2-40B4-BE49-F238E27FC236}">
+                <a16:creationId xmlns:a16="http://schemas.microsoft.com/office/drawing/2014/main" id="{CF273F14-9DD9-57D9-ABFF-12489807B32E}"/>
+              </a:ext>
+            </a:extLst>
+          </p:cNvPr>
+          <p:cNvSpPr>
+            <a:spLocks noGrp="1"/>
+          </p:cNvSpPr>
+          <p:nvPr>
+            <p:ph idx="1"/>
+          </p:nvPr>
+        </p:nvSpPr>
+        <p:spPr/>
+        <p:txBody>
+          <a:bodyPr/>
+          <a:lstStyle/>
+          <a:p>
+            <a:r>
+              <a:rPr lang="en-US" dirty="0"/>
+              <a:t>As a beginner of playing music on the piano</a:t>
+            </a:r>
+          </a:p>
+          <a:p>
+            <a:endParaRPr lang="en-US" dirty="0"/>
+          </a:p>
+          <a:p>
+            <a:r>
+              <a:rPr lang="en-US" dirty="0"/>
+              <a:t>I want an easy way to learn the sounds each note makes and where they are on the keyboard and to make simple music and save it for later</a:t>
+            </a:r>
+          </a:p>
+          <a:p>
+            <a:endParaRPr lang="en-US" dirty="0"/>
+          </a:p>
+          <a:p>
+            <a:r>
+              <a:rPr lang="en-US" dirty="0"/>
+              <a:t>So that I can get better at playing piano </a:t>
+            </a:r>
+          </a:p>
+        </p:txBody>
+      </p:sp>
+    </p:spTree>
+    <p:extLst>
+      <p:ext uri="{BB962C8B-B14F-4D97-AF65-F5344CB8AC3E}">
+        <p14:creationId xmlns:p14="http://schemas.microsoft.com/office/powerpoint/2010/main" val="3040965878"/>
+      </p:ext>
+    </p:extLst>
+  </p:cSld>
+  <p:clrMapOvr>
+    <a:masterClrMapping/>
+  </p:clrMapOvr>
+</p:sld>
+</file>
+
+<file path=ppt/slides/slide3.xml><?xml version="1.0" encoding="utf-8"?>
+<p:sld xmlns:a="http://schemas.openxmlformats.org/drawingml/2006/main" xmlns:r="http://schemas.openxmlformats.org/officeDocument/2006/relationships" xmlns:p="http://schemas.openxmlformats.org/presentationml/2006/main">
+  <p:cSld>
+    <p:spTree>
+      <p:nvGrpSpPr>
+        <p:cNvPr id="1" name=""/>
+        <p:cNvGrpSpPr/>
+        <p:nvPr/>
+      </p:nvGrpSpPr>
+      <p:grpSpPr>
+        <a:xfrm>
+          <a:off x="0" y="0"/>
+          <a:ext cx="0" cy="0"/>
+          <a:chOff x="0" y="0"/>
+          <a:chExt cx="0" cy="0"/>
+        </a:xfrm>
+      </p:grpSpPr>
+      <p:sp>
+        <p:nvSpPr>
+          <p:cNvPr id="2" name="Title 1">
+            <a:extLst>
+              <a:ext uri="{FF2B5EF4-FFF2-40B4-BE49-F238E27FC236}">
+                <a16:creationId xmlns:a16="http://schemas.microsoft.com/office/drawing/2014/main" id="{2B9235BE-1422-17F7-1C30-F9F98E0E77CF}"/>
+              </a:ext>
+            </a:extLst>
+          </p:cNvPr>
+          <p:cNvSpPr>
+            <a:spLocks noGrp="1"/>
+          </p:cNvSpPr>
+          <p:nvPr>
+            <p:ph type="title"/>
+          </p:nvPr>
+        </p:nvSpPr>
+        <p:spPr>
+          <a:xfrm>
+            <a:off x="186559" y="133898"/>
+            <a:ext cx="10515600" cy="664889"/>
+          </a:xfrm>
+        </p:spPr>
+        <p:txBody>
+          <a:bodyPr>
+            <a:normAutofit fontScale="90000"/>
+          </a:bodyPr>
+          <a:lstStyle/>
+          <a:p>
+            <a:r>
+              <a:rPr lang="en-US" dirty="0"/>
+              <a:t>Wireframe</a:t>
+            </a:r>
+          </a:p>
+        </p:txBody>
+      </p:sp>
+      <p:sp>
+        <p:nvSpPr>
+          <p:cNvPr id="4" name="Rectangle 3">
+            <a:extLst>
+              <a:ext uri="{FF2B5EF4-FFF2-40B4-BE49-F238E27FC236}">
+                <a16:creationId xmlns:a16="http://schemas.microsoft.com/office/drawing/2014/main" id="{C194A7D6-42F3-6DEC-9705-F024F5F339FB}"/>
+              </a:ext>
+            </a:extLst>
+          </p:cNvPr>
+          <p:cNvSpPr/>
+          <p:nvPr/>
+        </p:nvSpPr>
+        <p:spPr>
+          <a:xfrm>
+            <a:off x="2638096" y="872359"/>
+            <a:ext cx="6295697" cy="5591503"/>
+          </a:xfrm>
+          <a:prstGeom prst="rect">
+            <a:avLst/>
+          </a:prstGeom>
+          <a:noFill/>
+          <a:ln w="28575"/>
+        </p:spPr>
+        <p:style>
+          <a:lnRef idx="2">
+            <a:schemeClr val="accent1">
+              <a:shade val="15000"/>
+            </a:schemeClr>
+          </a:lnRef>
+          <a:fillRef idx="1">
+            <a:schemeClr val="accent1"/>
+          </a:fillRef>
+          <a:effectRef idx="0">
+            <a:schemeClr val="accent1"/>
+          </a:effectRef>
+          <a:fontRef idx="minor">
+            <a:schemeClr val="lt1"/>
+          </a:fontRef>
+        </p:style>
+        <p:txBody>
+          <a:bodyPr rtlCol="0" anchor="ctr"/>
+          <a:lstStyle/>
+          <a:p>
+            <a:pPr algn="ctr"/>
+            <a:endParaRPr lang="en-US"/>
+          </a:p>
+        </p:txBody>
+      </p:sp>
+      <p:sp>
+        <p:nvSpPr>
+          <p:cNvPr id="5" name="Rectangle 4">
+            <a:extLst>
+              <a:ext uri="{FF2B5EF4-FFF2-40B4-BE49-F238E27FC236}">
+                <a16:creationId xmlns:a16="http://schemas.microsoft.com/office/drawing/2014/main" id="{84C7E1CF-7D7C-3677-7063-D2A1547F2215}"/>
+              </a:ext>
+            </a:extLst>
+          </p:cNvPr>
+          <p:cNvSpPr/>
+          <p:nvPr/>
+        </p:nvSpPr>
+        <p:spPr>
+          <a:xfrm>
+            <a:off x="3962400" y="2207688"/>
+            <a:ext cx="3878317" cy="1481959"/>
+          </a:xfrm>
+          <a:prstGeom prst="rect">
+            <a:avLst/>
+          </a:prstGeom>
+        </p:spPr>
+        <p:style>
+          <a:lnRef idx="2">
+            <a:schemeClr val="accent1">
+              <a:shade val="15000"/>
+            </a:schemeClr>
+          </a:lnRef>
+          <a:fillRef idx="1">
+            <a:schemeClr val="accent1"/>
+          </a:fillRef>
+          <a:effectRef idx="0">
+            <a:schemeClr val="accent1"/>
+          </a:effectRef>
+          <a:fontRef idx="minor">
+            <a:schemeClr val="lt1"/>
+          </a:fontRef>
+        </p:style>
+        <p:txBody>
+          <a:bodyPr rtlCol="0" anchor="ctr"/>
+          <a:lstStyle/>
+          <a:p>
+            <a:pPr algn="ctr"/>
+            <a:r>
+              <a:rPr lang="en-US" sz="1400" dirty="0"/>
+              <a:t>Piano</a:t>
+            </a:r>
+          </a:p>
+        </p:txBody>
+      </p:sp>
+      <p:sp>
+        <p:nvSpPr>
+          <p:cNvPr id="6" name="Rectangle 5">
+            <a:extLst>
+              <a:ext uri="{FF2B5EF4-FFF2-40B4-BE49-F238E27FC236}">
+                <a16:creationId xmlns:a16="http://schemas.microsoft.com/office/drawing/2014/main" id="{02E8AC50-BCFD-D8BF-AF04-7BA15D326BB8}"/>
+              </a:ext>
+            </a:extLst>
+          </p:cNvPr>
+          <p:cNvSpPr/>
+          <p:nvPr/>
+        </p:nvSpPr>
+        <p:spPr>
+          <a:xfrm>
+            <a:off x="3962400" y="3920874"/>
+            <a:ext cx="3878317" cy="346841"/>
+          </a:xfrm>
+          <a:prstGeom prst="rect">
+            <a:avLst/>
+          </a:prstGeom>
+        </p:spPr>
+        <p:style>
+          <a:lnRef idx="2">
+            <a:schemeClr val="accent1">
+              <a:shade val="15000"/>
+            </a:schemeClr>
+          </a:lnRef>
+          <a:fillRef idx="1">
+            <a:schemeClr val="accent1"/>
+          </a:fillRef>
+          <a:effectRef idx="0">
+            <a:schemeClr val="accent1"/>
+          </a:effectRef>
+          <a:fontRef idx="minor">
+            <a:schemeClr val="lt1"/>
+          </a:fontRef>
+        </p:style>
+        <p:txBody>
+          <a:bodyPr rtlCol="0" anchor="ctr"/>
+          <a:lstStyle/>
+          <a:p>
+            <a:pPr algn="ctr"/>
+            <a:r>
+              <a:rPr lang="en-US" sz="1400" dirty="0"/>
+              <a:t>Box showing keys pressed</a:t>
+            </a:r>
+          </a:p>
+        </p:txBody>
+      </p:sp>
+      <p:sp>
+        <p:nvSpPr>
+          <p:cNvPr id="7" name="Rectangle 6">
+            <a:extLst>
+              <a:ext uri="{FF2B5EF4-FFF2-40B4-BE49-F238E27FC236}">
+                <a16:creationId xmlns:a16="http://schemas.microsoft.com/office/drawing/2014/main" id="{34931768-2B1E-F985-13D4-76D626292AA0}"/>
+              </a:ext>
+            </a:extLst>
+          </p:cNvPr>
+          <p:cNvSpPr/>
+          <p:nvPr/>
+        </p:nvSpPr>
+        <p:spPr>
+          <a:xfrm>
+            <a:off x="3962400" y="4498943"/>
+            <a:ext cx="1061545" cy="851338"/>
+          </a:xfrm>
+          <a:prstGeom prst="rect">
+            <a:avLst/>
+          </a:prstGeom>
+        </p:spPr>
+        <p:style>
+          <a:lnRef idx="2">
+            <a:schemeClr val="accent1">
+              <a:shade val="15000"/>
+            </a:schemeClr>
+          </a:lnRef>
+          <a:fillRef idx="1">
+            <a:schemeClr val="accent1"/>
+          </a:fillRef>
+          <a:effectRef idx="0">
+            <a:schemeClr val="accent1"/>
+          </a:effectRef>
+          <a:fontRef idx="minor">
+            <a:schemeClr val="lt1"/>
+          </a:fontRef>
+        </p:style>
+        <p:txBody>
+          <a:bodyPr rtlCol="0" anchor="ctr"/>
+          <a:lstStyle/>
+          <a:p>
+            <a:pPr algn="ctr"/>
+            <a:r>
+              <a:rPr lang="en-US" sz="1400" dirty="0"/>
+              <a:t>Save music button</a:t>
+            </a:r>
+          </a:p>
+        </p:txBody>
+      </p:sp>
+      <p:sp>
+        <p:nvSpPr>
+          <p:cNvPr id="8" name="Rectangle 7">
+            <a:extLst>
+              <a:ext uri="{FF2B5EF4-FFF2-40B4-BE49-F238E27FC236}">
+                <a16:creationId xmlns:a16="http://schemas.microsoft.com/office/drawing/2014/main" id="{A92714B6-25DC-6454-3D0A-5A97C036BCFB}"/>
+              </a:ext>
+            </a:extLst>
+          </p:cNvPr>
+          <p:cNvSpPr/>
+          <p:nvPr/>
+        </p:nvSpPr>
+        <p:spPr>
+          <a:xfrm>
+            <a:off x="5255171" y="4498943"/>
+            <a:ext cx="2585546" cy="851338"/>
+          </a:xfrm>
+          <a:prstGeom prst="rect">
+            <a:avLst/>
+          </a:prstGeom>
+        </p:spPr>
+        <p:style>
+          <a:lnRef idx="2">
+            <a:schemeClr val="accent1">
+              <a:shade val="15000"/>
+            </a:schemeClr>
+          </a:lnRef>
+          <a:fillRef idx="1">
+            <a:schemeClr val="accent1"/>
+          </a:fillRef>
+          <a:effectRef idx="0">
+            <a:schemeClr val="accent1"/>
+          </a:effectRef>
+          <a:fontRef idx="minor">
+            <a:schemeClr val="lt1"/>
+          </a:fontRef>
+        </p:style>
+        <p:txBody>
+          <a:bodyPr rtlCol="0" anchor="ctr"/>
+          <a:lstStyle/>
+          <a:p>
+            <a:pPr algn="ctr"/>
+            <a:r>
+              <a:rPr lang="en-US" sz="1400" dirty="0"/>
+              <a:t>List of saved music</a:t>
+            </a:r>
+          </a:p>
+        </p:txBody>
+      </p:sp>
+      <p:sp>
+        <p:nvSpPr>
+          <p:cNvPr id="10" name="Rectangle 9">
+            <a:extLst>
+              <a:ext uri="{FF2B5EF4-FFF2-40B4-BE49-F238E27FC236}">
+                <a16:creationId xmlns:a16="http://schemas.microsoft.com/office/drawing/2014/main" id="{BC5CB560-E454-81BA-5622-5A45BCED2545}"/>
+              </a:ext>
+            </a:extLst>
+          </p:cNvPr>
+          <p:cNvSpPr/>
+          <p:nvPr/>
+        </p:nvSpPr>
+        <p:spPr>
+          <a:xfrm>
+            <a:off x="6747641" y="1556046"/>
+            <a:ext cx="1093076" cy="472966"/>
+          </a:xfrm>
+          <a:prstGeom prst="rect">
+            <a:avLst/>
+          </a:prstGeom>
+        </p:spPr>
+        <p:style>
+          <a:lnRef idx="2">
+            <a:schemeClr val="accent1">
+              <a:shade val="15000"/>
+            </a:schemeClr>
+          </a:lnRef>
+          <a:fillRef idx="1">
+            <a:schemeClr val="accent1"/>
+          </a:fillRef>
+          <a:effectRef idx="0">
+            <a:schemeClr val="accent1"/>
+          </a:effectRef>
+          <a:fontRef idx="minor">
+            <a:schemeClr val="lt1"/>
+          </a:fontRef>
+        </p:style>
+        <p:txBody>
+          <a:bodyPr rtlCol="0" anchor="ctr"/>
+          <a:lstStyle/>
+          <a:p>
+            <a:pPr algn="ctr"/>
+            <a:r>
+              <a:rPr lang="en-US" sz="1200" dirty="0"/>
+              <a:t>Piano theme selector</a:t>
+            </a:r>
+          </a:p>
+        </p:txBody>
+      </p:sp>
+      <p:sp>
+        <p:nvSpPr>
+          <p:cNvPr id="11" name="Rectangle 10">
+            <a:extLst>
+              <a:ext uri="{FF2B5EF4-FFF2-40B4-BE49-F238E27FC236}">
+                <a16:creationId xmlns:a16="http://schemas.microsoft.com/office/drawing/2014/main" id="{8D774932-BBA6-1477-0D5D-C986120EB330}"/>
+              </a:ext>
+            </a:extLst>
+          </p:cNvPr>
+          <p:cNvSpPr/>
+          <p:nvPr/>
+        </p:nvSpPr>
+        <p:spPr>
+          <a:xfrm>
+            <a:off x="2771924" y="989350"/>
+            <a:ext cx="6096868" cy="472966"/>
+          </a:xfrm>
+          <a:prstGeom prst="rect">
+            <a:avLst/>
+          </a:prstGeom>
+        </p:spPr>
+        <p:style>
+          <a:lnRef idx="2">
+            <a:schemeClr val="accent1">
+              <a:shade val="15000"/>
+            </a:schemeClr>
+          </a:lnRef>
+          <a:fillRef idx="1">
+            <a:schemeClr val="accent1"/>
+          </a:fillRef>
+          <a:effectRef idx="0">
+            <a:schemeClr val="accent1"/>
+          </a:effectRef>
+          <a:fontRef idx="minor">
+            <a:schemeClr val="lt1"/>
+          </a:fontRef>
+        </p:style>
+        <p:txBody>
+          <a:bodyPr rtlCol="0" anchor="ctr"/>
+          <a:lstStyle/>
+          <a:p>
+            <a:pPr algn="ctr"/>
+            <a:r>
+              <a:rPr lang="en-US" sz="1200" dirty="0"/>
+              <a:t>Page Header – App Title</a:t>
+            </a:r>
+          </a:p>
+        </p:txBody>
+      </p:sp>
+      <p:sp>
+        <p:nvSpPr>
+          <p:cNvPr id="12" name="Rectangle 11">
+            <a:extLst>
+              <a:ext uri="{FF2B5EF4-FFF2-40B4-BE49-F238E27FC236}">
+                <a16:creationId xmlns:a16="http://schemas.microsoft.com/office/drawing/2014/main" id="{8B56653C-F3DB-3FBD-479F-8D864F89F8EA}"/>
+              </a:ext>
+            </a:extLst>
+          </p:cNvPr>
+          <p:cNvSpPr/>
+          <p:nvPr/>
+        </p:nvSpPr>
+        <p:spPr>
+          <a:xfrm>
+            <a:off x="2737510" y="5870027"/>
+            <a:ext cx="6096868" cy="472966"/>
+          </a:xfrm>
+          <a:prstGeom prst="rect">
+            <a:avLst/>
+          </a:prstGeom>
+        </p:spPr>
+        <p:style>
+          <a:lnRef idx="2">
+            <a:schemeClr val="accent1">
+              <a:shade val="15000"/>
+            </a:schemeClr>
+          </a:lnRef>
+          <a:fillRef idx="1">
+            <a:schemeClr val="accent1"/>
+          </a:fillRef>
+          <a:effectRef idx="0">
+            <a:schemeClr val="accent1"/>
+          </a:effectRef>
+          <a:fontRef idx="minor">
+            <a:schemeClr val="lt1"/>
+          </a:fontRef>
+        </p:style>
+        <p:txBody>
+          <a:bodyPr rtlCol="0" anchor="ctr"/>
+          <a:lstStyle/>
+          <a:p>
+            <a:pPr algn="ctr"/>
+            <a:r>
+              <a:rPr lang="en-US" sz="1200" dirty="0"/>
+              <a:t>Footer – the composers / </a:t>
+            </a:r>
+            <a:r>
+              <a:rPr lang="en-US" sz="1200" dirty="0" err="1"/>
+              <a:t>PianoMen</a:t>
+            </a:r>
+            <a:endParaRPr lang="en-US" sz="1200" dirty="0"/>
+          </a:p>
+        </p:txBody>
+      </p:sp>
+    </p:spTree>
+    <p:extLst>
+      <p:ext uri="{BB962C8B-B14F-4D97-AF65-F5344CB8AC3E}">
+        <p14:creationId xmlns:p14="http://schemas.microsoft.com/office/powerpoint/2010/main" val="3434756873"/>
+      </p:ext>
+    </p:extLst>
+  </p:cSld>
+  <p:clrMapOvr>
+    <a:masterClrMapping/>
+  </p:clrMapOvr>
+</p:sld>
+</file>
+
+<file path=ppt/slides/slide4.xml><?xml version="1.0" encoding="utf-8"?>
+<p:sld xmlns:a="http://schemas.openxmlformats.org/drawingml/2006/main" xmlns:r="http://schemas.openxmlformats.org/officeDocument/2006/relationships" xmlns:p="http://schemas.openxmlformats.org/presentationml/2006/main">
+  <p:cSld>
+    <p:spTree>
+      <p:nvGrpSpPr>
+        <p:cNvPr id="1" name=""/>
+        <p:cNvGrpSpPr/>
+        <p:nvPr/>
+      </p:nvGrpSpPr>
+      <p:grpSpPr>
+        <a:xfrm>
+          <a:off x="0" y="0"/>
+          <a:ext cx="0" cy="0"/>
+          <a:chOff x="0" y="0"/>
+          <a:chExt cx="0" cy="0"/>
+        </a:xfrm>
+      </p:grpSpPr>
+      <p:sp>
+        <p:nvSpPr>
+          <p:cNvPr id="2" name="Title 1">
+            <a:extLst>
+              <a:ext uri="{FF2B5EF4-FFF2-40B4-BE49-F238E27FC236}">
+                <a16:creationId xmlns:a16="http://schemas.microsoft.com/office/drawing/2014/main" id="{D9AC0C01-4F73-6B29-E307-27ABA0F41417}"/>
+              </a:ext>
+            </a:extLst>
+          </p:cNvPr>
+          <p:cNvSpPr>
+            <a:spLocks noGrp="1"/>
+          </p:cNvSpPr>
+          <p:nvPr>
+            <p:ph type="title"/>
+          </p:nvPr>
+        </p:nvSpPr>
+        <p:spPr>
+          <a:xfrm>
+            <a:off x="776056" y="169817"/>
+            <a:ext cx="10515600" cy="726828"/>
+          </a:xfrm>
+        </p:spPr>
+        <p:txBody>
+          <a:bodyPr/>
+          <a:lstStyle/>
+          <a:p>
+            <a:r>
+              <a:rPr lang="en-US" dirty="0"/>
+              <a:t>Breakdown of tasks</a:t>
+            </a:r>
+          </a:p>
+        </p:txBody>
+      </p:sp>
+      <p:sp>
+        <p:nvSpPr>
+          <p:cNvPr id="3" name="Content Placeholder 2">
+            <a:extLst>
+              <a:ext uri="{FF2B5EF4-FFF2-40B4-BE49-F238E27FC236}">
+                <a16:creationId xmlns:a16="http://schemas.microsoft.com/office/drawing/2014/main" id="{01F257F5-02BE-E38C-394C-62C59284C738}"/>
+              </a:ext>
+            </a:extLst>
+          </p:cNvPr>
+          <p:cNvSpPr>
+            <a:spLocks noGrp="1"/>
+          </p:cNvSpPr>
+          <p:nvPr>
+            <p:ph idx="1"/>
+          </p:nvPr>
+        </p:nvSpPr>
+        <p:spPr>
+          <a:xfrm>
+            <a:off x="776056" y="995877"/>
+            <a:ext cx="10515600" cy="5239543"/>
+          </a:xfrm>
+        </p:spPr>
+        <p:txBody>
+          <a:bodyPr>
+            <a:normAutofit fontScale="92500" lnSpcReduction="10000"/>
+          </a:bodyPr>
+          <a:lstStyle/>
+          <a:p>
+            <a:r>
+              <a:rPr lang="en-US" dirty="0"/>
+              <a:t>HTML</a:t>
+            </a:r>
+          </a:p>
+          <a:p>
+            <a:pPr lvl="1"/>
+            <a:r>
+              <a:rPr lang="en-US" dirty="0"/>
+              <a:t>Setup basic page elements</a:t>
+            </a:r>
+          </a:p>
+          <a:p>
+            <a:pPr lvl="1"/>
+            <a:r>
+              <a:rPr lang="en-US" dirty="0"/>
+              <a:t>Setup elements to create the piano</a:t>
+            </a:r>
+          </a:p>
+          <a:p>
+            <a:r>
+              <a:rPr lang="en-US" dirty="0"/>
+              <a:t>CSS (CSS Framework)</a:t>
+            </a:r>
+          </a:p>
+          <a:p>
+            <a:pPr lvl="1"/>
+            <a:r>
+              <a:rPr lang="en-US" dirty="0"/>
+              <a:t>Research and select CSS framework</a:t>
+            </a:r>
+          </a:p>
+          <a:p>
+            <a:pPr lvl="1"/>
+            <a:r>
+              <a:rPr lang="en-US" dirty="0"/>
+              <a:t>Define all the styles and theme parameters</a:t>
+            </a:r>
+          </a:p>
+          <a:p>
+            <a:r>
+              <a:rPr lang="en-US" dirty="0"/>
+              <a:t>JavaScript</a:t>
+            </a:r>
+          </a:p>
+          <a:p>
+            <a:pPr lvl="1"/>
+            <a:r>
+              <a:rPr lang="en-US" dirty="0"/>
+              <a:t>Create scripts for downloading sounds to local storage</a:t>
+            </a:r>
+          </a:p>
+          <a:p>
+            <a:pPr lvl="1"/>
+            <a:r>
+              <a:rPr lang="en-US" dirty="0"/>
+              <a:t>Create scripts for event listeners </a:t>
+            </a:r>
+          </a:p>
+          <a:p>
+            <a:pPr lvl="1"/>
+            <a:r>
+              <a:rPr lang="en-US" dirty="0"/>
+              <a:t>Create functions for each event</a:t>
+            </a:r>
+          </a:p>
+          <a:p>
+            <a:pPr lvl="2"/>
+            <a:r>
+              <a:rPr lang="en-US" dirty="0"/>
+              <a:t>Sound played</a:t>
+            </a:r>
+          </a:p>
+          <a:p>
+            <a:pPr lvl="2"/>
+            <a:r>
+              <a:rPr lang="en-US" dirty="0"/>
+              <a:t>Clicked key listed in box</a:t>
+            </a:r>
+          </a:p>
+          <a:p>
+            <a:pPr lvl="2"/>
+            <a:r>
+              <a:rPr lang="en-US" dirty="0"/>
+              <a:t>Key highlighted</a:t>
+            </a:r>
+          </a:p>
+          <a:p>
+            <a:pPr lvl="2"/>
+            <a:r>
+              <a:rPr lang="en-US" dirty="0"/>
+              <a:t>Save music</a:t>
+            </a:r>
+          </a:p>
+          <a:p>
+            <a:pPr lvl="2"/>
+            <a:r>
+              <a:rPr lang="en-US" dirty="0"/>
+              <a:t>Re-play saved music after click on list</a:t>
+            </a:r>
+          </a:p>
+        </p:txBody>
+      </p:sp>
+    </p:spTree>
+    <p:extLst>
+      <p:ext uri="{BB962C8B-B14F-4D97-AF65-F5344CB8AC3E}">
+        <p14:creationId xmlns:p14="http://schemas.microsoft.com/office/powerpoint/2010/main" val="2263468002"/>
       </p:ext>
     </p:extLst>
   </p:cSld>

</xml_diff>

<commit_message>
added MPV and Stretch goals
</commit_message>
<xml_diff>
--- a/projectIntro.pptx
+++ b/projectIntro.pptx
@@ -9,6 +9,8 @@
     <p:sldId id="257" r:id="rId3"/>
     <p:sldId id="258" r:id="rId4"/>
     <p:sldId id="259" r:id="rId5"/>
+    <p:sldId id="260" r:id="rId6"/>
+    <p:sldId id="261" r:id="rId7"/>
   </p:sldIdLst>
   <p:sldSz cx="12192000" cy="6858000"/>
   <p:notesSz cx="6858000" cy="9144000"/>
@@ -3352,7 +3354,7 @@
           <a:p>
             <a:r>
               <a:rPr lang="en-US" dirty="0" err="1"/>
-              <a:t>PianoMen</a:t>
+              <a:t>PianoPulse</a:t>
             </a:r>
             <a:r>
               <a:rPr lang="en-US" dirty="0"/>
@@ -3820,7 +3822,7 @@
             <a:pPr algn="ctr"/>
             <a:r>
               <a:rPr lang="en-US" sz="1400" dirty="0"/>
-              <a:t>Save music button</a:t>
+              <a:t>Record music </a:t>
             </a:r>
           </a:p>
         </p:txBody>
@@ -4023,6 +4025,54 @@
               <a:t>PianoMen</a:t>
             </a:r>
             <a:endParaRPr lang="en-US" sz="1200" dirty="0"/>
+          </a:p>
+        </p:txBody>
+      </p:sp>
+      <p:sp>
+        <p:nvSpPr>
+          <p:cNvPr id="13" name="TextBox 12">
+            <a:extLst>
+              <a:ext uri="{FF2B5EF4-FFF2-40B4-BE49-F238E27FC236}">
+                <a16:creationId xmlns:a16="http://schemas.microsoft.com/office/drawing/2014/main" id="{9837611D-03A2-D87F-42E1-D97A7A59F0D7}"/>
+              </a:ext>
+            </a:extLst>
+          </p:cNvPr>
+          <p:cNvSpPr txBox="1"/>
+          <p:nvPr/>
+        </p:nvSpPr>
+        <p:spPr>
+          <a:xfrm>
+            <a:off x="546465" y="4583287"/>
+            <a:ext cx="3415935" cy="738664"/>
+          </a:xfrm>
+          <a:prstGeom prst="rect">
+            <a:avLst/>
+          </a:prstGeom>
+          <a:noFill/>
+        </p:spPr>
+        <p:txBody>
+          <a:bodyPr wrap="none" rtlCol="0">
+            <a:spAutoFit/>
+          </a:bodyPr>
+          <a:lstStyle/>
+          <a:p>
+            <a:r>
+              <a:rPr lang="en-US" sz="1400" dirty="0"/>
+              <a:t>Starts showing “Record”. Once</a:t>
+            </a:r>
+            <a:br>
+              <a:rPr lang="en-US" sz="1400" dirty="0"/>
+            </a:br>
+            <a:r>
+              <a:rPr lang="en-US" sz="1400" dirty="0"/>
+              <a:t>clicked, switches to “Stop Recording”.</a:t>
+            </a:r>
+          </a:p>
+          <a:p>
+            <a:r>
+              <a:rPr lang="en-US" sz="1400" dirty="0"/>
+              <a:t>Once stopped, switches back to “Record”</a:t>
+            </a:r>
           </a:p>
         </p:txBody>
       </p:sp>
@@ -4113,13 +4163,13 @@
         </p:spPr>
         <p:txBody>
           <a:bodyPr>
-            <a:normAutofit fontScale="92500" lnSpcReduction="10000"/>
+            <a:normAutofit fontScale="92500" lnSpcReduction="20000"/>
           </a:bodyPr>
           <a:lstStyle/>
           <a:p>
             <a:r>
               <a:rPr lang="en-US" dirty="0"/>
-              <a:t>HTML</a:t>
+              <a:t>HTML (Vincent)</a:t>
             </a:r>
           </a:p>
           <a:p>
@@ -4139,7 +4189,7 @@
           <a:p>
             <a:r>
               <a:rPr lang="en-US" dirty="0"/>
-              <a:t>CSS (CSS Framework)</a:t>
+              <a:t>CSS (CSS Framework) (Kyle)</a:t>
             </a:r>
           </a:p>
           <a:p>
@@ -4150,6 +4200,13 @@
             </a:r>
           </a:p>
           <a:p>
+            <a:pPr lvl="2"/>
+            <a:r>
+              <a:rPr lang="en-US" dirty="0"/>
+              <a:t>Use drop-down menu for selecting – Bootstrap has this available</a:t>
+            </a:r>
+          </a:p>
+          <a:p>
             <a:pPr lvl="1"/>
             <a:r>
               <a:rPr lang="en-US" dirty="0"/>
@@ -4159,7 +4216,7 @@
           <a:p>
             <a:r>
               <a:rPr lang="en-US" dirty="0"/>
-              <a:t>JavaScript</a:t>
+              <a:t>JavaScript (Jan, Andrew)</a:t>
             </a:r>
           </a:p>
           <a:p>
@@ -4224,6 +4281,288 @@
     <p:extLst>
       <p:ext uri="{BB962C8B-B14F-4D97-AF65-F5344CB8AC3E}">
         <p14:creationId xmlns:p14="http://schemas.microsoft.com/office/powerpoint/2010/main" val="2263468002"/>
+      </p:ext>
+    </p:extLst>
+  </p:cSld>
+  <p:clrMapOvr>
+    <a:masterClrMapping/>
+  </p:clrMapOvr>
+</p:sld>
+</file>
+
+<file path=ppt/slides/slide5.xml><?xml version="1.0" encoding="utf-8"?>
+<p:sld xmlns:a="http://schemas.openxmlformats.org/drawingml/2006/main" xmlns:r="http://schemas.openxmlformats.org/officeDocument/2006/relationships" xmlns:p="http://schemas.openxmlformats.org/presentationml/2006/main">
+  <p:cSld>
+    <p:spTree>
+      <p:nvGrpSpPr>
+        <p:cNvPr id="1" name=""/>
+        <p:cNvGrpSpPr/>
+        <p:nvPr/>
+      </p:nvGrpSpPr>
+      <p:grpSpPr>
+        <a:xfrm>
+          <a:off x="0" y="0"/>
+          <a:ext cx="0" cy="0"/>
+          <a:chOff x="0" y="0"/>
+          <a:chExt cx="0" cy="0"/>
+        </a:xfrm>
+      </p:grpSpPr>
+      <p:sp>
+        <p:nvSpPr>
+          <p:cNvPr id="2" name="Title 1">
+            <a:extLst>
+              <a:ext uri="{FF2B5EF4-FFF2-40B4-BE49-F238E27FC236}">
+                <a16:creationId xmlns:a16="http://schemas.microsoft.com/office/drawing/2014/main" id="{81F63709-D698-6D2E-1FDD-4F330850823E}"/>
+              </a:ext>
+            </a:extLst>
+          </p:cNvPr>
+          <p:cNvSpPr>
+            <a:spLocks noGrp="1"/>
+          </p:cNvSpPr>
+          <p:nvPr>
+            <p:ph type="title"/>
+          </p:nvPr>
+        </p:nvSpPr>
+        <p:spPr>
+          <a:xfrm>
+            <a:off x="838200" y="365125"/>
+            <a:ext cx="10515600" cy="717951"/>
+          </a:xfrm>
+        </p:spPr>
+        <p:txBody>
+          <a:bodyPr/>
+          <a:lstStyle/>
+          <a:p>
+            <a:r>
+              <a:rPr lang="en-US" dirty="0"/>
+              <a:t>MVP</a:t>
+            </a:r>
+          </a:p>
+        </p:txBody>
+      </p:sp>
+      <p:sp>
+        <p:nvSpPr>
+          <p:cNvPr id="3" name="Content Placeholder 2">
+            <a:extLst>
+              <a:ext uri="{FF2B5EF4-FFF2-40B4-BE49-F238E27FC236}">
+                <a16:creationId xmlns:a16="http://schemas.microsoft.com/office/drawing/2014/main" id="{C846C11A-13ED-E2C3-E12A-609C45277F88}"/>
+              </a:ext>
+            </a:extLst>
+          </p:cNvPr>
+          <p:cNvSpPr>
+            <a:spLocks noGrp="1"/>
+          </p:cNvSpPr>
+          <p:nvPr>
+            <p:ph idx="1"/>
+          </p:nvPr>
+        </p:nvSpPr>
+        <p:spPr>
+          <a:xfrm>
+            <a:off x="838200" y="1253331"/>
+            <a:ext cx="10515600" cy="4351338"/>
+          </a:xfrm>
+        </p:spPr>
+        <p:txBody>
+          <a:bodyPr/>
+          <a:lstStyle/>
+          <a:p>
+            <a:pPr marL="514350" indent="-514350">
+              <a:buFont typeface="+mj-lt"/>
+              <a:buAutoNum type="arabicPeriod"/>
+            </a:pPr>
+            <a:r>
+              <a:rPr lang="en-US" dirty="0"/>
+              <a:t>User is able to see piano and press each piano key</a:t>
+            </a:r>
+          </a:p>
+          <a:p>
+            <a:pPr marL="514350" indent="-514350">
+              <a:buFont typeface="+mj-lt"/>
+              <a:buAutoNum type="arabicPeriod"/>
+            </a:pPr>
+            <a:r>
+              <a:rPr lang="en-US" dirty="0"/>
+              <a:t>When pressed, the key plays a sound, and a text-box displays which key was pressed</a:t>
+            </a:r>
+          </a:p>
+          <a:p>
+            <a:pPr marL="514350" indent="-514350">
+              <a:buFont typeface="+mj-lt"/>
+              <a:buAutoNum type="arabicPeriod"/>
+            </a:pPr>
+            <a:r>
+              <a:rPr lang="en-US" dirty="0"/>
+              <a:t>Theme selector for the piano is implemented (page background, dark key, light key)</a:t>
+            </a:r>
+          </a:p>
+          <a:p>
+            <a:pPr marL="514350" indent="-514350">
+              <a:buFont typeface="+mj-lt"/>
+              <a:buAutoNum type="arabicPeriod"/>
+            </a:pPr>
+            <a:r>
+              <a:rPr lang="en-US" dirty="0"/>
+              <a:t>Save music (based on keys entered) and then replay on click. Prompt pop-up asking to name the music recording. Records only one “song”</a:t>
+            </a:r>
+          </a:p>
+        </p:txBody>
+      </p:sp>
+    </p:spTree>
+    <p:extLst>
+      <p:ext uri="{BB962C8B-B14F-4D97-AF65-F5344CB8AC3E}">
+        <p14:creationId xmlns:p14="http://schemas.microsoft.com/office/powerpoint/2010/main" val="94857939"/>
+      </p:ext>
+    </p:extLst>
+  </p:cSld>
+  <p:clrMapOvr>
+    <a:masterClrMapping/>
+  </p:clrMapOvr>
+</p:sld>
+</file>
+
+<file path=ppt/slides/slide6.xml><?xml version="1.0" encoding="utf-8"?>
+<p:sld xmlns:a="http://schemas.openxmlformats.org/drawingml/2006/main" xmlns:r="http://schemas.openxmlformats.org/officeDocument/2006/relationships" xmlns:p="http://schemas.openxmlformats.org/presentationml/2006/main">
+  <p:cSld>
+    <p:spTree>
+      <p:nvGrpSpPr>
+        <p:cNvPr id="1" name=""/>
+        <p:cNvGrpSpPr/>
+        <p:nvPr/>
+      </p:nvGrpSpPr>
+      <p:grpSpPr>
+        <a:xfrm>
+          <a:off x="0" y="0"/>
+          <a:ext cx="0" cy="0"/>
+          <a:chOff x="0" y="0"/>
+          <a:chExt cx="0" cy="0"/>
+        </a:xfrm>
+      </p:grpSpPr>
+      <p:sp>
+        <p:nvSpPr>
+          <p:cNvPr id="2" name="Title 1">
+            <a:extLst>
+              <a:ext uri="{FF2B5EF4-FFF2-40B4-BE49-F238E27FC236}">
+                <a16:creationId xmlns:a16="http://schemas.microsoft.com/office/drawing/2014/main" id="{3726DE00-44F8-2D7D-6CD3-FE9718D76C3A}"/>
+              </a:ext>
+            </a:extLst>
+          </p:cNvPr>
+          <p:cNvSpPr>
+            <a:spLocks noGrp="1"/>
+          </p:cNvSpPr>
+          <p:nvPr>
+            <p:ph type="title"/>
+          </p:nvPr>
+        </p:nvSpPr>
+        <p:spPr>
+          <a:xfrm>
+            <a:off x="838200" y="365125"/>
+            <a:ext cx="10515600" cy="664685"/>
+          </a:xfrm>
+        </p:spPr>
+        <p:txBody>
+          <a:bodyPr>
+            <a:normAutofit fontScale="90000"/>
+          </a:bodyPr>
+          <a:lstStyle/>
+          <a:p>
+            <a:r>
+              <a:rPr lang="en-US" dirty="0"/>
+              <a:t>Stretch Goals</a:t>
+            </a:r>
+          </a:p>
+        </p:txBody>
+      </p:sp>
+      <p:sp>
+        <p:nvSpPr>
+          <p:cNvPr id="3" name="Content Placeholder 2">
+            <a:extLst>
+              <a:ext uri="{FF2B5EF4-FFF2-40B4-BE49-F238E27FC236}">
+                <a16:creationId xmlns:a16="http://schemas.microsoft.com/office/drawing/2014/main" id="{5659C1D7-B290-8F6D-D696-2CB0A484F725}"/>
+              </a:ext>
+            </a:extLst>
+          </p:cNvPr>
+          <p:cNvSpPr>
+            <a:spLocks noGrp="1"/>
+          </p:cNvSpPr>
+          <p:nvPr>
+            <p:ph idx="1"/>
+          </p:nvPr>
+        </p:nvSpPr>
+        <p:spPr>
+          <a:xfrm>
+            <a:off x="838200" y="1160940"/>
+            <a:ext cx="10515600" cy="4351338"/>
+          </a:xfrm>
+        </p:spPr>
+        <p:txBody>
+          <a:bodyPr>
+            <a:normAutofit fontScale="85000" lnSpcReduction="20000"/>
+          </a:bodyPr>
+          <a:lstStyle/>
+          <a:p>
+            <a:r>
+              <a:rPr lang="en-US" dirty="0"/>
+              <a:t>Recording allows to save multiple songs. Displays them as a drop-down (??). Plays the music on click</a:t>
+            </a:r>
+          </a:p>
+          <a:p>
+            <a:r>
+              <a:rPr lang="en-US" dirty="0"/>
+              <a:t>When the recording is played, it also highlights the keys that are playing</a:t>
+            </a:r>
+          </a:p>
+          <a:p>
+            <a:r>
+              <a:rPr lang="en-US" dirty="0"/>
+              <a:t>”Build your custom theme” for the piano</a:t>
+            </a:r>
+          </a:p>
+          <a:p>
+            <a:r>
+              <a:rPr lang="en-US" dirty="0"/>
+              <a:t>Make the keys look like “what Tish shared with us about how she created the rotating gradient on her button”</a:t>
+            </a:r>
+          </a:p>
+          <a:p>
+            <a:r>
+              <a:rPr lang="en-US" dirty="0"/>
+              <a:t>“Mood” coloring of the background based on key-press </a:t>
+            </a:r>
+          </a:p>
+          <a:p>
+            <a:r>
+              <a:rPr lang="en-US" dirty="0"/>
+              <a:t>Allow the note keys to be pressed for a time and play the sound during the whole duration</a:t>
+            </a:r>
+          </a:p>
+          <a:p>
+            <a:pPr marL="0" indent="0">
+              <a:buNone/>
+            </a:pPr>
+            <a:endParaRPr lang="en-US" dirty="0"/>
+          </a:p>
+          <a:p>
+            <a:pPr marL="0" indent="0">
+              <a:buNone/>
+            </a:pPr>
+            <a:r>
+              <a:rPr lang="en-US" dirty="0"/>
+              <a:t>STRETCH-STRETCH GOAL:</a:t>
+            </a:r>
+          </a:p>
+          <a:p>
+            <a:pPr lvl="1"/>
+            <a:r>
+              <a:rPr lang="en-US" dirty="0"/>
+              <a:t>Learning game – ”pick the right note”: When game is active, page displays a note to press, and user has to click on the right note. </a:t>
+            </a:r>
+          </a:p>
+        </p:txBody>
+      </p:sp>
+    </p:spTree>
+    <p:extLst>
+      <p:ext uri="{BB962C8B-B14F-4D97-AF65-F5344CB8AC3E}">
+        <p14:creationId xmlns:p14="http://schemas.microsoft.com/office/powerpoint/2010/main" val="14111542"/>
       </p:ext>
     </p:extLst>
   </p:cSld>

</xml_diff>